<commit_message>
went on with the report
</commit_message>
<xml_diff>
--- a/RendezVous.pptx
+++ b/RendezVous.pptx
@@ -6,6 +6,9 @@
   </p:sldMasterIdLst>
   <p:sldIdLst>
     <p:sldId id="257" r:id="rId2"/>
+    <p:sldId id="258" r:id="rId3"/>
+    <p:sldId id="259" r:id="rId4"/>
+    <p:sldId id="260" r:id="rId5"/>
   </p:sldIdLst>
   <p:sldSz cx="12192000" cy="6858000"/>
   <p:notesSz cx="6858000" cy="9144000"/>
@@ -104,6 +107,11 @@
       </a:defRPr>
     </a:lvl9pPr>
   </p:defaultTextStyle>
+  <p:extLst>
+    <p:ext uri="{EFAFB233-063F-42B5-8137-9DF3F51BA10A}">
+      <p15:sldGuideLst xmlns:p15="http://schemas.microsoft.com/office/powerpoint/2012/main"/>
+    </p:ext>
+  </p:extLst>
 </p:presentation>
 </file>
 
@@ -238,7 +246,7 @@
           <a:p>
             <a:fld id="{EEA32ED9-4C36-467B-BFFF-6E096BE1D2E4}" type="datetimeFigureOut">
               <a:rPr lang="it-IT" smtClean="0"/>
-              <a:t>12/06/2022</a:t>
+              <a:t>13/06/2022</a:t>
             </a:fld>
             <a:endParaRPr lang="it-IT"/>
           </a:p>
@@ -408,7 +416,7 @@
           <a:p>
             <a:fld id="{EEA32ED9-4C36-467B-BFFF-6E096BE1D2E4}" type="datetimeFigureOut">
               <a:rPr lang="it-IT" smtClean="0"/>
-              <a:t>12/06/2022</a:t>
+              <a:t>13/06/2022</a:t>
             </a:fld>
             <a:endParaRPr lang="it-IT"/>
           </a:p>
@@ -588,7 +596,7 @@
           <a:p>
             <a:fld id="{EEA32ED9-4C36-467B-BFFF-6E096BE1D2E4}" type="datetimeFigureOut">
               <a:rPr lang="it-IT" smtClean="0"/>
-              <a:t>12/06/2022</a:t>
+              <a:t>13/06/2022</a:t>
             </a:fld>
             <a:endParaRPr lang="it-IT"/>
           </a:p>
@@ -758,7 +766,7 @@
           <a:p>
             <a:fld id="{EEA32ED9-4C36-467B-BFFF-6E096BE1D2E4}" type="datetimeFigureOut">
               <a:rPr lang="it-IT" smtClean="0"/>
-              <a:t>12/06/2022</a:t>
+              <a:t>13/06/2022</a:t>
             </a:fld>
             <a:endParaRPr lang="it-IT"/>
           </a:p>
@@ -1004,7 +1012,7 @@
           <a:p>
             <a:fld id="{EEA32ED9-4C36-467B-BFFF-6E096BE1D2E4}" type="datetimeFigureOut">
               <a:rPr lang="it-IT" smtClean="0"/>
-              <a:t>12/06/2022</a:t>
+              <a:t>13/06/2022</a:t>
             </a:fld>
             <a:endParaRPr lang="it-IT"/>
           </a:p>
@@ -1236,7 +1244,7 @@
           <a:p>
             <a:fld id="{EEA32ED9-4C36-467B-BFFF-6E096BE1D2E4}" type="datetimeFigureOut">
               <a:rPr lang="it-IT" smtClean="0"/>
-              <a:t>12/06/2022</a:t>
+              <a:t>13/06/2022</a:t>
             </a:fld>
             <a:endParaRPr lang="it-IT"/>
           </a:p>
@@ -1603,7 +1611,7 @@
           <a:p>
             <a:fld id="{EEA32ED9-4C36-467B-BFFF-6E096BE1D2E4}" type="datetimeFigureOut">
               <a:rPr lang="it-IT" smtClean="0"/>
-              <a:t>12/06/2022</a:t>
+              <a:t>13/06/2022</a:t>
             </a:fld>
             <a:endParaRPr lang="it-IT"/>
           </a:p>
@@ -1721,7 +1729,7 @@
           <a:p>
             <a:fld id="{EEA32ED9-4C36-467B-BFFF-6E096BE1D2E4}" type="datetimeFigureOut">
               <a:rPr lang="it-IT" smtClean="0"/>
-              <a:t>12/06/2022</a:t>
+              <a:t>13/06/2022</a:t>
             </a:fld>
             <a:endParaRPr lang="it-IT"/>
           </a:p>
@@ -1816,7 +1824,7 @@
           <a:p>
             <a:fld id="{EEA32ED9-4C36-467B-BFFF-6E096BE1D2E4}" type="datetimeFigureOut">
               <a:rPr lang="it-IT" smtClean="0"/>
-              <a:t>12/06/2022</a:t>
+              <a:t>13/06/2022</a:t>
             </a:fld>
             <a:endParaRPr lang="it-IT"/>
           </a:p>
@@ -2093,7 +2101,7 @@
           <a:p>
             <a:fld id="{EEA32ED9-4C36-467B-BFFF-6E096BE1D2E4}" type="datetimeFigureOut">
               <a:rPr lang="it-IT" smtClean="0"/>
-              <a:t>12/06/2022</a:t>
+              <a:t>13/06/2022</a:t>
             </a:fld>
             <a:endParaRPr lang="it-IT"/>
           </a:p>
@@ -2350,7 +2358,7 @@
           <a:p>
             <a:fld id="{EEA32ED9-4C36-467B-BFFF-6E096BE1D2E4}" type="datetimeFigureOut">
               <a:rPr lang="it-IT" smtClean="0"/>
-              <a:t>12/06/2022</a:t>
+              <a:t>13/06/2022</a:t>
             </a:fld>
             <a:endParaRPr lang="it-IT"/>
           </a:p>
@@ -2572,7 +2580,7 @@
           <a:p>
             <a:fld id="{EEA32ED9-4C36-467B-BFFF-6E096BE1D2E4}" type="datetimeFigureOut">
               <a:rPr lang="it-IT" smtClean="0"/>
-              <a:t>12/06/2022</a:t>
+              <a:t>13/06/2022</a:t>
             </a:fld>
             <a:endParaRPr lang="it-IT"/>
           </a:p>
@@ -3069,6 +3077,404 @@
 </p:sld>
 </file>
 
+<file path=ppt/slides/slide2.xml><?xml version="1.0" encoding="utf-8"?>
+<p:sld xmlns:a="http://schemas.openxmlformats.org/drawingml/2006/main" xmlns:r="http://schemas.openxmlformats.org/officeDocument/2006/relationships" xmlns:p="http://schemas.openxmlformats.org/presentationml/2006/main">
+  <p:cSld>
+    <p:spTree>
+      <p:nvGrpSpPr>
+        <p:cNvPr id="1" name=""/>
+        <p:cNvGrpSpPr/>
+        <p:nvPr/>
+      </p:nvGrpSpPr>
+      <p:grpSpPr>
+        <a:xfrm>
+          <a:off x="0" y="0"/>
+          <a:ext cx="0" cy="0"/>
+          <a:chOff x="0" y="0"/>
+          <a:chExt cx="0" cy="0"/>
+        </a:xfrm>
+      </p:grpSpPr>
+      <p:sp>
+        <p:nvSpPr>
+          <p:cNvPr id="5" name="Titolo 4">
+            <a:extLst>
+              <a:ext uri="{FF2B5EF4-FFF2-40B4-BE49-F238E27FC236}">
+                <a16:creationId xmlns:a16="http://schemas.microsoft.com/office/drawing/2014/main" id="{F07B0D03-F3F2-48F2-B3FE-9ABDA9E5B4C2}"/>
+              </a:ext>
+            </a:extLst>
+          </p:cNvPr>
+          <p:cNvSpPr>
+            <a:spLocks noGrp="1"/>
+          </p:cNvSpPr>
+          <p:nvPr>
+            <p:ph type="title"/>
+          </p:nvPr>
+        </p:nvSpPr>
+        <p:spPr/>
+        <p:txBody>
+          <a:bodyPr>
+            <a:normAutofit/>
+          </a:bodyPr>
+          <a:lstStyle/>
+          <a:p>
+            <a:r>
+              <a:rPr lang="it-IT" sz="6000" dirty="0"/>
+              <a:t>Perché usare </a:t>
+            </a:r>
+            <a:r>
+              <a:rPr lang="it-IT" sz="6000" dirty="0" err="1"/>
+              <a:t>RendezVous</a:t>
+            </a:r>
+            <a:r>
+              <a:rPr lang="it-IT" sz="6000" dirty="0"/>
+              <a:t>?</a:t>
+            </a:r>
+          </a:p>
+        </p:txBody>
+      </p:sp>
+      <p:sp>
+        <p:nvSpPr>
+          <p:cNvPr id="6" name="Segnaposto contenuto 5">
+            <a:extLst>
+              <a:ext uri="{FF2B5EF4-FFF2-40B4-BE49-F238E27FC236}">
+                <a16:creationId xmlns:a16="http://schemas.microsoft.com/office/drawing/2014/main" id="{4A63B21C-900C-4049-8EF3-4BDD9806C2F9}"/>
+              </a:ext>
+            </a:extLst>
+          </p:cNvPr>
+          <p:cNvSpPr>
+            <a:spLocks noGrp="1"/>
+          </p:cNvSpPr>
+          <p:nvPr>
+            <p:ph idx="1"/>
+          </p:nvPr>
+        </p:nvSpPr>
+        <p:spPr>
+          <a:xfrm>
+            <a:off x="838200" y="1825624"/>
+            <a:ext cx="10515600" cy="4808257"/>
+          </a:xfrm>
+        </p:spPr>
+        <p:txBody>
+          <a:bodyPr>
+            <a:normAutofit fontScale="92500" lnSpcReduction="10000"/>
+          </a:bodyPr>
+          <a:lstStyle/>
+          <a:p>
+            <a:r>
+              <a:rPr lang="it-IT" dirty="0" err="1"/>
+              <a:t>RendezVous</a:t>
+            </a:r>
+            <a:r>
+              <a:rPr lang="it-IT" dirty="0"/>
+              <a:t> è un’applicazione che ti semplifica l’organizzazione delle uscite con gli amici.</a:t>
+            </a:r>
+          </a:p>
+          <a:p>
+            <a:r>
+              <a:rPr lang="it-IT" dirty="0"/>
+              <a:t>Un utente crea un’uscita da proporre a uno o più gruppi di amici.</a:t>
+            </a:r>
+          </a:p>
+          <a:p>
+            <a:r>
+              <a:rPr lang="it-IT" dirty="0"/>
+              <a:t>In questa uscita si può anche inserire la posizione GPS e una foto.</a:t>
+            </a:r>
+          </a:p>
+          <a:p>
+            <a:r>
+              <a:rPr lang="it-IT" dirty="0"/>
+              <a:t>Agli utenti a cui viene proposta un’uscita viene visualizzata una nuova card dalla quale si possono visualizzare informazioni come la distanza tra l’utente e il posto dell’uscita, la foto e la descrizione. La card dispone anche di un pulsante per aprire Google Maps.</a:t>
+            </a:r>
+          </a:p>
+          <a:p>
+            <a:r>
+              <a:rPr lang="it-IT" dirty="0"/>
+              <a:t>Trascinando la card verso sinistra l’utente può votare il giorno che preferisce.</a:t>
+            </a:r>
+          </a:p>
+          <a:p>
+            <a:r>
+              <a:rPr lang="it-IT" dirty="0"/>
+              <a:t>Quando tutti gli amici avranno votato, comparirà un evento sul calendario e arriverà una notifica.</a:t>
+            </a:r>
+          </a:p>
+        </p:txBody>
+      </p:sp>
+    </p:spTree>
+    <p:extLst>
+      <p:ext uri="{BB962C8B-B14F-4D97-AF65-F5344CB8AC3E}">
+        <p14:creationId xmlns:p14="http://schemas.microsoft.com/office/powerpoint/2010/main" val="2985652074"/>
+      </p:ext>
+    </p:extLst>
+  </p:cSld>
+  <p:clrMapOvr>
+    <a:masterClrMapping/>
+  </p:clrMapOvr>
+</p:sld>
+</file>
+
+<file path=ppt/slides/slide3.xml><?xml version="1.0" encoding="utf-8"?>
+<p:sld xmlns:a="http://schemas.openxmlformats.org/drawingml/2006/main" xmlns:r="http://schemas.openxmlformats.org/officeDocument/2006/relationships" xmlns:p="http://schemas.openxmlformats.org/presentationml/2006/main">
+  <p:cSld>
+    <p:spTree>
+      <p:nvGrpSpPr>
+        <p:cNvPr id="1" name=""/>
+        <p:cNvGrpSpPr/>
+        <p:nvPr/>
+      </p:nvGrpSpPr>
+      <p:grpSpPr>
+        <a:xfrm>
+          <a:off x="0" y="0"/>
+          <a:ext cx="0" cy="0"/>
+          <a:chOff x="0" y="0"/>
+          <a:chExt cx="0" cy="0"/>
+        </a:xfrm>
+      </p:grpSpPr>
+      <p:sp>
+        <p:nvSpPr>
+          <p:cNvPr id="2" name="Titolo 1">
+            <a:extLst>
+              <a:ext uri="{FF2B5EF4-FFF2-40B4-BE49-F238E27FC236}">
+                <a16:creationId xmlns:a16="http://schemas.microsoft.com/office/drawing/2014/main" id="{9A29CA76-BBE3-4FB2-924A-27BAF3535E7E}"/>
+              </a:ext>
+            </a:extLst>
+          </p:cNvPr>
+          <p:cNvSpPr>
+            <a:spLocks noGrp="1"/>
+          </p:cNvSpPr>
+          <p:nvPr>
+            <p:ph type="title"/>
+          </p:nvPr>
+        </p:nvSpPr>
+        <p:spPr/>
+        <p:txBody>
+          <a:bodyPr/>
+          <a:lstStyle/>
+          <a:p>
+            <a:r>
+              <a:rPr lang="it-IT" dirty="0"/>
+              <a:t>Tecnologie utilizzate</a:t>
+            </a:r>
+          </a:p>
+        </p:txBody>
+      </p:sp>
+      <p:sp>
+        <p:nvSpPr>
+          <p:cNvPr id="3" name="Segnaposto contenuto 2">
+            <a:extLst>
+              <a:ext uri="{FF2B5EF4-FFF2-40B4-BE49-F238E27FC236}">
+                <a16:creationId xmlns:a16="http://schemas.microsoft.com/office/drawing/2014/main" id="{E8BEAFD7-AA3D-406A-B78E-FB7A63F29AEA}"/>
+              </a:ext>
+            </a:extLst>
+          </p:cNvPr>
+          <p:cNvSpPr>
+            <a:spLocks noGrp="1"/>
+          </p:cNvSpPr>
+          <p:nvPr>
+            <p:ph idx="1"/>
+          </p:nvPr>
+        </p:nvSpPr>
+        <p:spPr>
+          <a:xfrm>
+            <a:off x="838200" y="1538754"/>
+            <a:ext cx="10515600" cy="4853082"/>
+          </a:xfrm>
+        </p:spPr>
+        <p:txBody>
+          <a:bodyPr>
+            <a:normAutofit/>
+          </a:bodyPr>
+          <a:lstStyle/>
+          <a:p>
+            <a:r>
+              <a:rPr lang="it-IT" dirty="0"/>
+              <a:t>Room per la creazione e gestione di un database locale.</a:t>
+            </a:r>
+          </a:p>
+          <a:p>
+            <a:r>
+              <a:rPr lang="it-IT" dirty="0" err="1"/>
+              <a:t>Material</a:t>
+            </a:r>
+            <a:r>
+              <a:rPr lang="it-IT" dirty="0"/>
+              <a:t> Design per l’implementazione di alcuni aspetti grafici.</a:t>
+            </a:r>
+          </a:p>
+          <a:p>
+            <a:r>
+              <a:rPr lang="it-IT" dirty="0"/>
+              <a:t>Grande uso di </a:t>
+            </a:r>
+            <a:r>
+              <a:rPr lang="it-IT" dirty="0" err="1"/>
+              <a:t>RecycleView</a:t>
+            </a:r>
+            <a:r>
+              <a:rPr lang="it-IT" dirty="0"/>
+              <a:t> per la visualizzazione di giorni e </a:t>
+            </a:r>
+            <a:r>
+              <a:rPr lang="it-IT" dirty="0" err="1"/>
+              <a:t>circles</a:t>
+            </a:r>
+            <a:r>
+              <a:rPr lang="it-IT" dirty="0"/>
+              <a:t> of friends.</a:t>
+            </a:r>
+          </a:p>
+          <a:p>
+            <a:r>
+              <a:rPr lang="it-IT" dirty="0" err="1"/>
+              <a:t>MaterialCardView</a:t>
+            </a:r>
+            <a:endParaRPr lang="it-IT" dirty="0"/>
+          </a:p>
+          <a:p>
+            <a:r>
+              <a:rPr lang="it-IT" dirty="0"/>
+              <a:t>Calendario customizzato:</a:t>
+            </a:r>
+          </a:p>
+          <a:p>
+            <a:pPr marL="0" indent="0">
+              <a:buNone/>
+            </a:pPr>
+            <a:r>
+              <a:rPr lang="it-IT" dirty="0"/>
+              <a:t>	 </a:t>
+            </a:r>
+            <a:r>
+              <a:rPr lang="it-IT" dirty="0">
+                <a:hlinkClick r:id="rId2"/>
+              </a:rPr>
+              <a:t>https://github.com/Applandeo/Material-Calendar-View.git</a:t>
+            </a:r>
+            <a:endParaRPr lang="it-IT" dirty="0"/>
+          </a:p>
+          <a:p>
+            <a:r>
+              <a:rPr lang="it-IT" dirty="0"/>
+              <a:t>Uso </a:t>
+            </a:r>
+            <a:r>
+              <a:rPr lang="it-IT" dirty="0" err="1"/>
+              <a:t>com.google.android.gms.location</a:t>
+            </a:r>
+            <a:r>
+              <a:rPr lang="it-IT" dirty="0"/>
+              <a:t> per il GPS</a:t>
+            </a:r>
+          </a:p>
+          <a:p>
+            <a:r>
+              <a:rPr lang="it-IT" dirty="0" err="1"/>
+              <a:t>Lottie</a:t>
+            </a:r>
+            <a:r>
+              <a:rPr lang="it-IT" dirty="0"/>
+              <a:t> per le animazioni: https://lottiefiles.com/</a:t>
+            </a:r>
+          </a:p>
+          <a:p>
+            <a:endParaRPr lang="it-IT" dirty="0"/>
+          </a:p>
+        </p:txBody>
+      </p:sp>
+    </p:spTree>
+    <p:extLst>
+      <p:ext uri="{BB962C8B-B14F-4D97-AF65-F5344CB8AC3E}">
+        <p14:creationId xmlns:p14="http://schemas.microsoft.com/office/powerpoint/2010/main" val="1165287237"/>
+      </p:ext>
+    </p:extLst>
+  </p:cSld>
+  <p:clrMapOvr>
+    <a:masterClrMapping/>
+  </p:clrMapOvr>
+</p:sld>
+</file>
+
+<file path=ppt/slides/slide4.xml><?xml version="1.0" encoding="utf-8"?>
+<p:sld xmlns:a="http://schemas.openxmlformats.org/drawingml/2006/main" xmlns:r="http://schemas.openxmlformats.org/officeDocument/2006/relationships" xmlns:p="http://schemas.openxmlformats.org/presentationml/2006/main">
+  <p:cSld>
+    <p:spTree>
+      <p:nvGrpSpPr>
+        <p:cNvPr id="1" name=""/>
+        <p:cNvGrpSpPr/>
+        <p:nvPr/>
+      </p:nvGrpSpPr>
+      <p:grpSpPr>
+        <a:xfrm>
+          <a:off x="0" y="0"/>
+          <a:ext cx="0" cy="0"/>
+          <a:chOff x="0" y="0"/>
+          <a:chExt cx="0" cy="0"/>
+        </a:xfrm>
+      </p:grpSpPr>
+      <p:sp>
+        <p:nvSpPr>
+          <p:cNvPr id="2" name="Titolo 1">
+            <a:extLst>
+              <a:ext uri="{FF2B5EF4-FFF2-40B4-BE49-F238E27FC236}">
+                <a16:creationId xmlns:a16="http://schemas.microsoft.com/office/drawing/2014/main" id="{F8892C50-1913-4B57-94E7-B10FFDFE3DB3}"/>
+              </a:ext>
+            </a:extLst>
+          </p:cNvPr>
+          <p:cNvSpPr>
+            <a:spLocks noGrp="1"/>
+          </p:cNvSpPr>
+          <p:nvPr>
+            <p:ph type="title"/>
+          </p:nvPr>
+        </p:nvSpPr>
+        <p:spPr/>
+        <p:txBody>
+          <a:bodyPr/>
+          <a:lstStyle/>
+          <a:p>
+            <a:endParaRPr lang="it-IT"/>
+          </a:p>
+        </p:txBody>
+      </p:sp>
+      <p:sp>
+        <p:nvSpPr>
+          <p:cNvPr id="3" name="Segnaposto contenuto 2">
+            <a:extLst>
+              <a:ext uri="{FF2B5EF4-FFF2-40B4-BE49-F238E27FC236}">
+                <a16:creationId xmlns:a16="http://schemas.microsoft.com/office/drawing/2014/main" id="{5C2BA4C4-5355-4647-8CCF-45A436A26B2A}"/>
+              </a:ext>
+            </a:extLst>
+          </p:cNvPr>
+          <p:cNvSpPr>
+            <a:spLocks noGrp="1"/>
+          </p:cNvSpPr>
+          <p:nvPr>
+            <p:ph idx="1"/>
+          </p:nvPr>
+        </p:nvSpPr>
+        <p:spPr/>
+        <p:txBody>
+          <a:bodyPr/>
+          <a:lstStyle/>
+          <a:p>
+            <a:endParaRPr lang="it-IT"/>
+          </a:p>
+        </p:txBody>
+      </p:sp>
+    </p:spTree>
+    <p:extLst>
+      <p:ext uri="{BB962C8B-B14F-4D97-AF65-F5344CB8AC3E}">
+        <p14:creationId xmlns:p14="http://schemas.microsoft.com/office/powerpoint/2010/main" val="519281848"/>
+      </p:ext>
+    </p:extLst>
+  </p:cSld>
+  <p:clrMapOvr>
+    <a:masterClrMapping/>
+  </p:clrMapOvr>
+</p:sld>
+</file>
+
 <file path=ppt/theme/theme1.xml><?xml version="1.0" encoding="utf-8"?>
 <a:theme xmlns:a="http://schemas.openxmlformats.org/drawingml/2006/main" name="Office Theme">
   <a:themeElements>

</xml_diff>